<commit_message>
Application des correctives signaler lors de la soutenance
</commit_message>
<xml_diff>
--- a/Ohmyfood.pptx
+++ b/Ohmyfood.pptx
@@ -506,7 +506,7 @@
             <a:fld id="{BB1F31F3-0360-43B5-86CD-504C03F637A7}" type="datetimeFigureOut">
               <a:rPr lang="ru-RU" smtClean="0"/>
               <a:pPr/>
-              <a:t>11.05.2020</a:t>
+              <a:t>16.05.2020</a:t>
             </a:fld>
             <a:endParaRPr lang="ru-RU"/>
           </a:p>
@@ -673,7 +673,7 @@
             <a:fld id="{BB1F31F3-0360-43B5-86CD-504C03F637A7}" type="datetimeFigureOut">
               <a:rPr lang="ru-RU" smtClean="0"/>
               <a:pPr/>
-              <a:t>11.05.2020</a:t>
+              <a:t>16.05.2020</a:t>
             </a:fld>
             <a:endParaRPr lang="ru-RU"/>
           </a:p>
@@ -850,7 +850,7 @@
             <a:fld id="{BB1F31F3-0360-43B5-86CD-504C03F637A7}" type="datetimeFigureOut">
               <a:rPr lang="ru-RU" smtClean="0"/>
               <a:pPr/>
-              <a:t>11.05.2020</a:t>
+              <a:t>16.05.2020</a:t>
             </a:fld>
             <a:endParaRPr lang="ru-RU"/>
           </a:p>
@@ -1021,7 +1021,7 @@
             <a:fld id="{BB1F31F3-0360-43B5-86CD-504C03F637A7}" type="datetimeFigureOut">
               <a:rPr lang="ru-RU" smtClean="0"/>
               <a:pPr/>
-              <a:t>11.05.2020</a:t>
+              <a:t>16.05.2020</a:t>
             </a:fld>
             <a:endParaRPr lang="ru-RU"/>
           </a:p>
@@ -1478,7 +1478,7 @@
             <a:fld id="{BB1F31F3-0360-43B5-86CD-504C03F637A7}" type="datetimeFigureOut">
               <a:rPr lang="ru-RU" smtClean="0"/>
               <a:pPr/>
-              <a:t>11.05.2020</a:t>
+              <a:t>16.05.2020</a:t>
             </a:fld>
             <a:endParaRPr lang="ru-RU"/>
           </a:p>
@@ -1744,7 +1744,7 @@
             <a:fld id="{BB1F31F3-0360-43B5-86CD-504C03F637A7}" type="datetimeFigureOut">
               <a:rPr lang="ru-RU" smtClean="0"/>
               <a:pPr/>
-              <a:t>11.05.2020</a:t>
+              <a:t>16.05.2020</a:t>
             </a:fld>
             <a:endParaRPr lang="ru-RU"/>
           </a:p>
@@ -2120,7 +2120,7 @@
             <a:fld id="{BB1F31F3-0360-43B5-86CD-504C03F637A7}" type="datetimeFigureOut">
               <a:rPr lang="ru-RU" smtClean="0"/>
               <a:pPr/>
-              <a:t>11.05.2020</a:t>
+              <a:t>16.05.2020</a:t>
             </a:fld>
             <a:endParaRPr lang="ru-RU"/>
           </a:p>
@@ -2244,7 +2244,7 @@
             <a:fld id="{BB1F31F3-0360-43B5-86CD-504C03F637A7}" type="datetimeFigureOut">
               <a:rPr lang="ru-RU" smtClean="0"/>
               <a:pPr/>
-              <a:t>11.05.2020</a:t>
+              <a:t>16.05.2020</a:t>
             </a:fld>
             <a:endParaRPr lang="ru-RU"/>
           </a:p>
@@ -2336,7 +2336,7 @@
             <a:fld id="{BB1F31F3-0360-43B5-86CD-504C03F637A7}" type="datetimeFigureOut">
               <a:rPr lang="ru-RU" smtClean="0"/>
               <a:pPr/>
-              <a:t>11.05.2020</a:t>
+              <a:t>16.05.2020</a:t>
             </a:fld>
             <a:endParaRPr lang="ru-RU"/>
           </a:p>
@@ -2587,7 +2587,7 @@
             <a:fld id="{BB1F31F3-0360-43B5-86CD-504C03F637A7}" type="datetimeFigureOut">
               <a:rPr lang="ru-RU" smtClean="0"/>
               <a:pPr/>
-              <a:t>11.05.2020</a:t>
+              <a:t>16.05.2020</a:t>
             </a:fld>
             <a:endParaRPr lang="ru-RU"/>
           </a:p>
@@ -2848,7 +2848,7 @@
             <a:fld id="{BB1F31F3-0360-43B5-86CD-504C03F637A7}" type="datetimeFigureOut">
               <a:rPr lang="ru-RU" smtClean="0"/>
               <a:pPr/>
-              <a:t>11.05.2020</a:t>
+              <a:t>16.05.2020</a:t>
             </a:fld>
             <a:endParaRPr lang="ru-RU"/>
           </a:p>
@@ -3254,7 +3254,7 @@
             <a:fld id="{BB1F31F3-0360-43B5-86CD-504C03F637A7}" type="datetimeFigureOut">
               <a:rPr lang="ru-RU" smtClean="0"/>
               <a:pPr/>
-              <a:t>11.05.2020</a:t>
+              <a:t>16.05.2020</a:t>
             </a:fld>
             <a:endParaRPr lang="ru-RU"/>
           </a:p>
@@ -3930,7 +3930,6 @@
               <a:rPr lang="en-US" sz="2400" dirty="0" smtClean="0"/>
               <a:t> le nom du restaurant et un h2 avec le mot “menu”</a:t>
             </a:r>
-            <a:endParaRPr lang="en-US" sz="2400" dirty="0" smtClean="0"/>
           </a:p>
         </p:txBody>
       </p:sp>
@@ -3951,8 +3950,41 @@
         </p:blipFill>
         <p:spPr bwMode="auto">
           <a:xfrm>
-            <a:off x="3878844" y="1214423"/>
+            <a:off x="3878844" y="142852"/>
             <a:ext cx="5265156" cy="2786081"/>
+          </a:xfrm>
+          <a:prstGeom prst="rect">
+            <a:avLst/>
+          </a:prstGeom>
+          <a:noFill/>
+          <a:ln w="9525">
+            <a:noFill/>
+            <a:miter lim="800000"/>
+            <a:headEnd/>
+            <a:tailEnd/>
+          </a:ln>
+          <a:effectLst/>
+        </p:spPr>
+      </p:pic>
+      <p:pic>
+        <p:nvPicPr>
+          <p:cNvPr id="1027" name="Picture 3"/>
+          <p:cNvPicPr>
+            <a:picLocks noChangeAspect="1" noChangeArrowheads="1"/>
+          </p:cNvPicPr>
+          <p:nvPr/>
+        </p:nvPicPr>
+        <p:blipFill>
+          <a:blip r:embed="rId3"/>
+          <a:srcRect/>
+          <a:stretch>
+            <a:fillRect/>
+          </a:stretch>
+        </p:blipFill>
+        <p:spPr bwMode="auto">
+          <a:xfrm>
+            <a:off x="3857620" y="3143248"/>
+            <a:ext cx="5557115" cy="2214578"/>
           </a:xfrm>
           <a:prstGeom prst="rect">
             <a:avLst/>
@@ -4035,7 +4067,7 @@
         <p:spPr>
           <a:xfrm>
             <a:off x="428596" y="1214422"/>
-            <a:ext cx="7467600" cy="4525963"/>
+            <a:ext cx="3786214" cy="4643470"/>
           </a:xfrm>
         </p:spPr>
         <p:txBody>
@@ -4160,8 +4192,41 @@
         </p:blipFill>
         <p:spPr bwMode="auto">
           <a:xfrm>
-            <a:off x="3430251" y="2857496"/>
-            <a:ext cx="5713749" cy="3729045"/>
+            <a:off x="4218330" y="1500174"/>
+            <a:ext cx="4925670" cy="3214710"/>
+          </a:xfrm>
+          <a:prstGeom prst="rect">
+            <a:avLst/>
+          </a:prstGeom>
+          <a:noFill/>
+          <a:ln w="9525">
+            <a:noFill/>
+            <a:miter lim="800000"/>
+            <a:headEnd/>
+            <a:tailEnd/>
+          </a:ln>
+          <a:effectLst/>
+        </p:spPr>
+      </p:pic>
+      <p:pic>
+        <p:nvPicPr>
+          <p:cNvPr id="2051" name="Picture 3"/>
+          <p:cNvPicPr>
+            <a:picLocks noChangeAspect="1" noChangeArrowheads="1"/>
+          </p:cNvPicPr>
+          <p:nvPr/>
+        </p:nvPicPr>
+        <p:blipFill>
+          <a:blip r:embed="rId3"/>
+          <a:srcRect/>
+          <a:stretch>
+            <a:fillRect/>
+          </a:stretch>
+        </p:blipFill>
+        <p:spPr bwMode="auto">
+          <a:xfrm>
+            <a:off x="120650" y="4857760"/>
+            <a:ext cx="9023350" cy="1879600"/>
           </a:xfrm>
           <a:prstGeom prst="rect">
             <a:avLst/>
@@ -4330,7 +4395,6 @@
               <a:rPr lang="en-US" dirty="0" smtClean="0"/>
               <a:t> transition</a:t>
             </a:r>
-            <a:endParaRPr lang="en-US" dirty="0" smtClean="0"/>
           </a:p>
         </p:txBody>
       </p:sp>
@@ -5114,12 +5178,21 @@
             </a:r>
             <a:r>
               <a:rPr lang="fr-FR" dirty="0" smtClean="0"/>
-              <a:t>ésentant le logo du site , 4 pages contenant chacune le </a:t>
+              <a:t>ésentant le </a:t>
             </a:r>
             <a:r>
               <a:rPr lang="fr-FR" dirty="0" smtClean="0"/>
-              <a:t>menu</a:t>
-            </a:r>
+              <a:t>logo, </a:t>
+            </a:r>
+            <a:r>
+              <a:rPr lang="fr-FR" dirty="0" smtClean="0"/>
+              <a:t>4 pages contenant chacune le </a:t>
+            </a:r>
+            <a:r>
+              <a:rPr lang="fr-FR" dirty="0" smtClean="0"/>
+              <a:t>menu d’un restaurant</a:t>
+            </a:r>
+            <a:endParaRPr lang="fr-FR" dirty="0" smtClean="0"/>
           </a:p>
           <a:p>
             <a:pPr>
@@ -5127,15 +5200,11 @@
             </a:pPr>
             <a:r>
               <a:rPr lang="fr-FR" dirty="0" smtClean="0"/>
-              <a:t>4 </a:t>
+              <a:t>Ainsi que 4 </a:t>
             </a:r>
             <a:r>
               <a:rPr lang="fr-FR" dirty="0" smtClean="0"/>
-              <a:t>animations </a:t>
-            </a:r>
-            <a:r>
-              <a:rPr lang="fr-FR" dirty="0" smtClean="0"/>
-              <a:t>css:</a:t>
+              <a:t>animations css:</a:t>
             </a:r>
             <a:endParaRPr lang="ru-RU" dirty="0" smtClean="0"/>
           </a:p>
@@ -5624,11 +5693,11 @@
             </a:r>
             <a:r>
               <a:rPr lang="en-US" dirty="0" smtClean="0"/>
-              <a:t> de styles </a:t>
-            </a:r>
-            <a:r>
-              <a:rPr lang="en-US" dirty="0" err="1" smtClean="0"/>
-              <a:t>css</a:t>
+              <a:t> de </a:t>
+            </a:r>
+            <a:r>
+              <a:rPr lang="en-US" dirty="0" smtClean="0"/>
+              <a:t>style</a:t>
             </a:r>
             <a:endParaRPr lang="en-US" dirty="0" smtClean="0"/>
           </a:p>
@@ -5702,7 +5771,7 @@
         <p:spPr/>
         <p:txBody>
           <a:bodyPr>
-            <a:normAutofit fontScale="77500" lnSpcReduction="20000"/>
+            <a:normAutofit fontScale="92500" lnSpcReduction="10000"/>
           </a:bodyPr>
           <a:lstStyle/>
           <a:p>
@@ -5764,7 +5833,19 @@
             </a:r>
             <a:r>
               <a:rPr lang="en-US" dirty="0" smtClean="0"/>
-              <a:t> de styles avec </a:t>
+              <a:t> de styles </a:t>
+            </a:r>
+            <a:r>
+              <a:rPr lang="en-US" dirty="0" smtClean="0"/>
+              <a:t>avec </a:t>
+            </a:r>
+            <a:r>
+              <a:rPr lang="en-US" dirty="0" err="1" smtClean="0"/>
+              <a:t>une</a:t>
+            </a:r>
+            <a:r>
+              <a:rPr lang="en-US" dirty="0" smtClean="0"/>
+              <a:t> </a:t>
             </a:r>
             <a:r>
               <a:rPr lang="en-US" dirty="0" err="1" smtClean="0"/>
@@ -5788,15 +5869,11 @@
             </a:r>
             <a:r>
               <a:rPr lang="en-US" dirty="0" smtClean="0"/>
-              <a:t> ( </a:t>
-            </a:r>
-            <a:r>
-              <a:rPr lang="en-US" dirty="0" err="1" smtClean="0"/>
-              <a:t>comme</a:t>
-            </a:r>
-            <a:r>
-              <a:rPr lang="en-US" dirty="0" smtClean="0"/>
-              <a:t> par </a:t>
+              <a:t> </a:t>
+            </a:r>
+            <a:r>
+              <a:rPr lang="en-US" dirty="0" smtClean="0"/>
+              <a:t>(par </a:t>
             </a:r>
             <a:r>
               <a:rPr lang="en-US" dirty="0" err="1" smtClean="0"/>
@@ -5856,7 +5933,7 @@
             </a:r>
             <a:r>
               <a:rPr lang="en-US" dirty="0" err="1" smtClean="0"/>
-              <a:t>presentes</a:t>
+              <a:t>présentes</a:t>
             </a:r>
             <a:r>
               <a:rPr lang="en-US" dirty="0" smtClean="0"/>
@@ -5876,21 +5953,43 @@
             </a:r>
             <a:r>
               <a:rPr lang="en-US" dirty="0" smtClean="0"/>
-              <a:t> site ) </a:t>
-            </a:r>
-          </a:p>
-          <a:p>
-            <a:r>
-              <a:rPr lang="en-US" dirty="0" smtClean="0"/>
-              <a:t>Installation: Sass n</a:t>
-            </a:r>
-            <a:r>
-              <a:rPr lang="fr-FR" dirty="0" smtClean="0"/>
+              <a:t> site </a:t>
+            </a:r>
+            <a:r>
+              <a:rPr lang="en-US" dirty="0" smtClean="0"/>
+              <a:t>). </a:t>
+            </a:r>
+            <a:r>
+              <a:rPr lang="en-US" dirty="0" err="1" smtClean="0"/>
+              <a:t>Ainsi</a:t>
+            </a:r>
+            <a:r>
+              <a:rPr lang="en-US" dirty="0" smtClean="0"/>
+              <a:t> le </a:t>
+            </a:r>
+            <a:r>
+              <a:rPr lang="en-US" dirty="0" err="1" smtClean="0"/>
+              <a:t>css</a:t>
+            </a:r>
+            <a:r>
+              <a:rPr lang="en-US" dirty="0" smtClean="0"/>
+              <a:t> </a:t>
+            </a:r>
+            <a:r>
+              <a:rPr lang="en-US" dirty="0" err="1" smtClean="0"/>
+              <a:t>est</a:t>
+            </a:r>
+            <a:r>
+              <a:rPr lang="en-US" dirty="0" smtClean="0"/>
+              <a:t> </a:t>
+            </a:r>
+            <a:r>
+              <a:rPr lang="en-US" dirty="0" err="1" smtClean="0"/>
               <a:t>é</a:t>
             </a:r>
             <a:r>
               <a:rPr lang="en-US" dirty="0" err="1" smtClean="0"/>
-              <a:t>cessite</a:t>
+              <a:t>crit</a:t>
             </a:r>
             <a:r>
               <a:rPr lang="en-US" dirty="0" smtClean="0"/>
@@ -5898,27 +5997,113 @@
             </a:r>
             <a:r>
               <a:rPr lang="en-US" dirty="0" err="1" smtClean="0"/>
-              <a:t>toutefois</a:t>
-            </a:r>
-            <a:r>
-              <a:rPr lang="en-US" dirty="0" smtClean="0"/>
-              <a:t> d’</a:t>
-            </a:r>
-            <a:r>
-              <a:rPr lang="fr-FR" dirty="0" smtClean="0"/>
-              <a:t>etre installer sur notre machine de developpement , pour cela il suffit d’executer la commande « node install –g sass »</a:t>
-            </a:r>
-          </a:p>
-          <a:p>
-            <a:r>
-              <a:rPr lang="fr-FR" dirty="0" smtClean="0"/>
-              <a:t>Utilisation: son utilisation ne require que l’execution de la commande sass –watch ./dossier1:/dossier2</a:t>
-            </a:r>
-            <a:r>
-              <a:rPr lang="en-US" dirty="0" smtClean="0"/>
-              <a:t>  </a:t>
-            </a:r>
-            <a:endParaRPr lang="ru-RU" dirty="0"/>
+              <a:t>dans</a:t>
+            </a:r>
+            <a:r>
+              <a:rPr lang="en-US" dirty="0" smtClean="0"/>
+              <a:t> des </a:t>
+            </a:r>
+            <a:r>
+              <a:rPr lang="en-US" dirty="0" err="1" smtClean="0"/>
+              <a:t>fichiers</a:t>
+            </a:r>
+            <a:r>
+              <a:rPr lang="en-US" dirty="0" smtClean="0"/>
+              <a:t> </a:t>
+            </a:r>
+            <a:r>
+              <a:rPr lang="en-US" dirty="0" err="1" smtClean="0"/>
+              <a:t>portant</a:t>
+            </a:r>
+            <a:r>
+              <a:rPr lang="en-US" dirty="0" smtClean="0"/>
+              <a:t> </a:t>
+            </a:r>
+            <a:r>
+              <a:rPr lang="en-US" dirty="0" err="1" smtClean="0"/>
+              <a:t>l’extension</a:t>
+            </a:r>
+            <a:r>
+              <a:rPr lang="en-US" dirty="0" smtClean="0"/>
+              <a:t> .</a:t>
+            </a:r>
+            <a:r>
+              <a:rPr lang="en-US" dirty="0" err="1" smtClean="0"/>
+              <a:t>scss</a:t>
+            </a:r>
+            <a:r>
+              <a:rPr lang="en-US" dirty="0" smtClean="0"/>
+              <a:t>, </a:t>
+            </a:r>
+            <a:r>
+              <a:rPr lang="en-US" dirty="0" err="1" smtClean="0"/>
+              <a:t>ce</a:t>
+            </a:r>
+            <a:r>
+              <a:rPr lang="en-US" dirty="0" smtClean="0"/>
+              <a:t> </a:t>
+            </a:r>
+            <a:r>
+              <a:rPr lang="en-US" dirty="0" err="1" smtClean="0"/>
+              <a:t>sont</a:t>
+            </a:r>
+            <a:r>
+              <a:rPr lang="en-US" dirty="0" smtClean="0"/>
+              <a:t> </a:t>
+            </a:r>
+            <a:r>
+              <a:rPr lang="en-US" dirty="0" err="1" smtClean="0"/>
+              <a:t>ensuite</a:t>
+            </a:r>
+            <a:r>
+              <a:rPr lang="en-US" dirty="0" smtClean="0"/>
+              <a:t> </a:t>
+            </a:r>
+            <a:r>
+              <a:rPr lang="en-US" dirty="0" err="1" smtClean="0"/>
+              <a:t>ces</a:t>
+            </a:r>
+            <a:r>
+              <a:rPr lang="en-US" dirty="0" smtClean="0"/>
+              <a:t> </a:t>
+            </a:r>
+            <a:r>
+              <a:rPr lang="en-US" dirty="0" err="1" smtClean="0"/>
+              <a:t>fichiers</a:t>
+            </a:r>
+            <a:r>
+              <a:rPr lang="en-US" dirty="0" smtClean="0"/>
+              <a:t> qui </a:t>
+            </a:r>
+            <a:r>
+              <a:rPr lang="en-US" dirty="0" err="1" smtClean="0"/>
+              <a:t>seront</a:t>
+            </a:r>
+            <a:r>
+              <a:rPr lang="en-US" dirty="0" smtClean="0"/>
+              <a:t> </a:t>
+            </a:r>
+            <a:r>
+              <a:rPr lang="en-US" dirty="0" err="1" smtClean="0"/>
+              <a:t>transpilés</a:t>
+            </a:r>
+            <a:r>
+              <a:rPr lang="en-US" dirty="0" smtClean="0"/>
+              <a:t> en simple </a:t>
+            </a:r>
+            <a:r>
+              <a:rPr lang="en-US" dirty="0" err="1" smtClean="0"/>
+              <a:t>feuille</a:t>
+            </a:r>
+            <a:r>
+              <a:rPr lang="en-US" dirty="0" smtClean="0"/>
+              <a:t> de style </a:t>
+            </a:r>
+            <a:r>
+              <a:rPr lang="en-US" dirty="0" err="1" smtClean="0"/>
+              <a:t>css</a:t>
+            </a:r>
+            <a:endParaRPr lang="en-US" dirty="0" smtClean="0"/>
           </a:p>
         </p:txBody>
       </p:sp>
@@ -6013,15 +6198,11 @@
             </a:r>
             <a:r>
               <a:rPr lang="en-US" dirty="0" smtClean="0"/>
-              <a:t> composer de 5 page au total et </a:t>
-            </a:r>
-            <a:r>
-              <a:rPr lang="en-US" dirty="0" err="1" smtClean="0"/>
-              <a:t>donc</a:t>
-            </a:r>
-            <a:r>
-              <a:rPr lang="en-US" dirty="0" smtClean="0"/>
-              <a:t> de 5 </a:t>
+              <a:t> </a:t>
+            </a:r>
+            <a:r>
+              <a:rPr lang="en-US" dirty="0" smtClean="0"/>
+              <a:t>de 5 </a:t>
             </a:r>
             <a:r>
               <a:rPr lang="en-US" dirty="0" err="1" smtClean="0"/>
@@ -6161,7 +6342,15 @@
             </a:r>
             <a:r>
               <a:rPr lang="en-US" dirty="0" smtClean="0"/>
-              <a:t> le dossier menu  </a:t>
+              <a:t> le dossier </a:t>
+            </a:r>
+            <a:r>
+              <a:rPr lang="en-US" dirty="0" smtClean="0"/>
+              <a:t>“</a:t>
+            </a:r>
+            <a:r>
+              <a:rPr lang="en-US" dirty="0" smtClean="0"/>
+              <a:t>menu”</a:t>
             </a:r>
             <a:endParaRPr lang="ru-RU" dirty="0"/>
           </a:p>
@@ -6435,70 +6624,33 @@
           <a:p>
             <a:r>
               <a:rPr lang="fr-FR" dirty="0" smtClean="0"/>
-              <a:t>Base: </a:t>
-            </a:r>
+              <a:t>Base: contient les fichiers qui définissent les fondations de notre site, par exemple la police de caractères… .</a:t>
+            </a:r>
+          </a:p>
+          <a:p>
             <a:r>
               <a:rPr lang="fr-FR" dirty="0" smtClean="0"/>
-              <a:t>contient les fichiers qui définissent les fondations de </a:t>
+              <a:t>Utils</a:t>
             </a:r>
             <a:r>
               <a:rPr lang="fr-FR" dirty="0" smtClean="0"/>
-              <a:t>notre site</a:t>
+              <a:t>: regroupe les </a:t>
             </a:r>
             <a:r>
               <a:rPr lang="fr-FR" dirty="0" smtClean="0"/>
-              <a:t>, par exemple la police de </a:t>
-            </a:r>
+              <a:t>fichiers contentant nos variables, fonctions, mixins…</a:t>
+            </a:r>
+          </a:p>
+          <a:p>
             <a:r>
               <a:rPr lang="fr-FR" dirty="0" smtClean="0"/>
-              <a:t>caractères… .</a:t>
+              <a:t>Layout: est le dossier où nous mettons nos blocs BEM qui contiennent ce qui est réutilisable, par exemple un header pour les mises en page de grande taille ou un footer </a:t>
             </a:r>
           </a:p>
           <a:p>
             <a:r>
               <a:rPr lang="fr-FR" dirty="0" smtClean="0"/>
-              <a:t>Utils: fichiers contentant nos </a:t>
-            </a:r>
-            <a:r>
-              <a:rPr lang="fr-FR" dirty="0" smtClean="0"/>
-              <a:t>variables, fonctions, </a:t>
-            </a:r>
-            <a:r>
-              <a:rPr lang="fr-FR" dirty="0" smtClean="0"/>
-              <a:t>mixins…</a:t>
-            </a:r>
-          </a:p>
-          <a:p>
-            <a:r>
-              <a:rPr lang="fr-FR" dirty="0" smtClean="0"/>
-              <a:t>Layout: </a:t>
-            </a:r>
-            <a:r>
-              <a:rPr lang="fr-FR" dirty="0" smtClean="0"/>
-              <a:t>est le dossier où </a:t>
-            </a:r>
-            <a:r>
-              <a:rPr lang="fr-FR" dirty="0" smtClean="0"/>
-              <a:t>nous mettons nos </a:t>
-            </a:r>
-            <a:r>
-              <a:rPr lang="fr-FR" dirty="0" smtClean="0"/>
-              <a:t>blocs BEM qui contiennent ce qui est réutilisable, par exemple un header pour les mises en page de grande taille ou un footer </a:t>
-            </a:r>
-            <a:endParaRPr lang="fr-FR" dirty="0" smtClean="0"/>
-          </a:p>
-          <a:p>
-            <a:r>
-              <a:rPr lang="fr-FR" dirty="0" smtClean="0"/>
-              <a:t>Page:</a:t>
-            </a:r>
-            <a:r>
-              <a:rPr lang="fr-FR" dirty="0" smtClean="0"/>
-              <a:t>contient les blocs de code qui ne s’appliquent qu’à une seule </a:t>
-            </a:r>
-            <a:r>
-              <a:rPr lang="fr-FR" dirty="0" smtClean="0"/>
-              <a:t>page.</a:t>
+              <a:t>Page:contient les blocs de code qui ne s’appliquent qu’à une seule page.</a:t>
             </a:r>
             <a:endParaRPr lang="ru-RU" dirty="0"/>
           </a:p>
@@ -6644,7 +6796,6 @@
               <a:rPr lang="en-US" dirty="0" smtClean="0"/>
               <a:t> menu</a:t>
             </a:r>
-            <a:endParaRPr lang="en-US" dirty="0" smtClean="0"/>
           </a:p>
           <a:p>
             <a:pPr>

</xml_diff>